<commit_message>
Added vidoes for laundry and vacuum
</commit_message>
<xml_diff>
--- a/cgrandhi_spalania.pptx
+++ b/cgrandhi_spalania.pptx
@@ -1145,9 +1145,16 @@
         <a:lstStyle/>
         <a:p>
           <a:r>
-            <a:rPr lang="en-US"/>
+            <a:rPr lang="en-US" dirty="0"/>
             <a:t>Vacuum- Non Real Time: </a:t>
           </a:r>
+          <a:r>
+            <a:rPr lang="en-US" dirty="0">
+              <a:hlinkClick xmlns:r="http://schemas.openxmlformats.org/officeDocument/2006/relationships" r:id="rId3"/>
+            </a:rPr>
+            <a:t>https://youtu.be/f9YrJ3E30Mk</a:t>
+          </a:r>
+          <a:endParaRPr lang="en-US" dirty="0"/>
         </a:p>
       </dgm:t>
     </dgm:pt>
@@ -1181,8 +1188,18 @@
         <a:lstStyle/>
         <a:p>
           <a:r>
-            <a:rPr lang="en-US"/>
+            <a:rPr lang="en-US" dirty="0"/>
             <a:t>Vacuum- Real Time: </a:t>
+          </a:r>
+          <a:r>
+            <a:rPr lang="en-US" dirty="0">
+              <a:hlinkClick xmlns:r="http://schemas.openxmlformats.org/officeDocument/2006/relationships" r:id="rId4"/>
+            </a:rPr>
+            <a:t>https://youtu.be/93BD09TxFtk</a:t>
+          </a:r>
+          <a:r>
+            <a:rPr lang="en-US" dirty="0"/>
+            <a:t> </a:t>
           </a:r>
         </a:p>
       </dgm:t>
@@ -1663,9 +1680,16 @@
             <a:buNone/>
           </a:pPr>
           <a:r>
-            <a:rPr lang="en-US" sz="3100" kern="1200"/>
+            <a:rPr lang="en-US" sz="3100" kern="1200" dirty="0"/>
             <a:t>Vacuum- Non Real Time: </a:t>
           </a:r>
+          <a:r>
+            <a:rPr lang="en-US" sz="3100" kern="1200" dirty="0">
+              <a:hlinkClick xmlns:r="http://schemas.openxmlformats.org/officeDocument/2006/relationships" r:id="rId3"/>
+            </a:rPr>
+            <a:t>https://youtu.be/f9YrJ3E30Mk</a:t>
+          </a:r>
+          <a:endParaRPr lang="en-US" sz="3100" kern="1200" dirty="0"/>
         </a:p>
       </dsp:txBody>
       <dsp:txXfrm>
@@ -1773,8 +1797,18 @@
             <a:buNone/>
           </a:pPr>
           <a:r>
-            <a:rPr lang="en-US" sz="3100" kern="1200"/>
+            <a:rPr lang="en-US" sz="3100" kern="1200" dirty="0"/>
             <a:t>Vacuum- Real Time: </a:t>
+          </a:r>
+          <a:r>
+            <a:rPr lang="en-US" sz="3100" kern="1200" dirty="0">
+              <a:hlinkClick xmlns:r="http://schemas.openxmlformats.org/officeDocument/2006/relationships" r:id="rId4"/>
+            </a:rPr>
+            <a:t>https://youtu.be/93BD09TxFtk</a:t>
+          </a:r>
+          <a:r>
+            <a:rPr lang="en-US" sz="3100" kern="1200" dirty="0"/>
+            <a:t> </a:t>
           </a:r>
         </a:p>
       </dsp:txBody>
@@ -3434,7 +3468,7 @@
           <a:p>
             <a:fld id="{18404ADA-F128-401B-AB3D-33BBB5CCB503}" type="datetimeFigureOut">
               <a:rPr lang="en-US" smtClean="0"/>
-              <a:t>3/3/2019</a:t>
+              <a:t>3/4/2019</a:t>
             </a:fld>
             <a:endParaRPr lang="en-US"/>
           </a:p>
@@ -3632,7 +3666,7 @@
           <a:p>
             <a:fld id="{18404ADA-F128-401B-AB3D-33BBB5CCB503}" type="datetimeFigureOut">
               <a:rPr lang="en-US" smtClean="0"/>
-              <a:t>3/3/2019</a:t>
+              <a:t>3/4/2019</a:t>
             </a:fld>
             <a:endParaRPr lang="en-US"/>
           </a:p>
@@ -3840,7 +3874,7 @@
           <a:p>
             <a:fld id="{18404ADA-F128-401B-AB3D-33BBB5CCB503}" type="datetimeFigureOut">
               <a:rPr lang="en-US" smtClean="0"/>
-              <a:t>3/3/2019</a:t>
+              <a:t>3/4/2019</a:t>
             </a:fld>
             <a:endParaRPr lang="en-US"/>
           </a:p>
@@ -4038,7 +4072,7 @@
           <a:p>
             <a:fld id="{18404ADA-F128-401B-AB3D-33BBB5CCB503}" type="datetimeFigureOut">
               <a:rPr lang="en-US" smtClean="0"/>
-              <a:t>3/3/2019</a:t>
+              <a:t>3/4/2019</a:t>
             </a:fld>
             <a:endParaRPr lang="en-US"/>
           </a:p>
@@ -4313,7 +4347,7 @@
           <a:p>
             <a:fld id="{18404ADA-F128-401B-AB3D-33BBB5CCB503}" type="datetimeFigureOut">
               <a:rPr lang="en-US" smtClean="0"/>
-              <a:t>3/3/2019</a:t>
+              <a:t>3/4/2019</a:t>
             </a:fld>
             <a:endParaRPr lang="en-US"/>
           </a:p>
@@ -4578,7 +4612,7 @@
           <a:p>
             <a:fld id="{18404ADA-F128-401B-AB3D-33BBB5CCB503}" type="datetimeFigureOut">
               <a:rPr lang="en-US" smtClean="0"/>
-              <a:t>3/3/2019</a:t>
+              <a:t>3/4/2019</a:t>
             </a:fld>
             <a:endParaRPr lang="en-US"/>
           </a:p>
@@ -4990,7 +5024,7 @@
           <a:p>
             <a:fld id="{18404ADA-F128-401B-AB3D-33BBB5CCB503}" type="datetimeFigureOut">
               <a:rPr lang="en-US" smtClean="0"/>
-              <a:t>3/3/2019</a:t>
+              <a:t>3/4/2019</a:t>
             </a:fld>
             <a:endParaRPr lang="en-US"/>
           </a:p>
@@ -5131,7 +5165,7 @@
           <a:p>
             <a:fld id="{18404ADA-F128-401B-AB3D-33BBB5CCB503}" type="datetimeFigureOut">
               <a:rPr lang="en-US" smtClean="0"/>
-              <a:t>3/3/2019</a:t>
+              <a:t>3/4/2019</a:t>
             </a:fld>
             <a:endParaRPr lang="en-US"/>
           </a:p>
@@ -5244,7 +5278,7 @@
           <a:p>
             <a:fld id="{18404ADA-F128-401B-AB3D-33BBB5CCB503}" type="datetimeFigureOut">
               <a:rPr lang="en-US" smtClean="0"/>
-              <a:t>3/3/2019</a:t>
+              <a:t>3/4/2019</a:t>
             </a:fld>
             <a:endParaRPr lang="en-US"/>
           </a:p>
@@ -5555,7 +5589,7 @@
           <a:p>
             <a:fld id="{18404ADA-F128-401B-AB3D-33BBB5CCB503}" type="datetimeFigureOut">
               <a:rPr lang="en-US" smtClean="0"/>
-              <a:t>3/3/2019</a:t>
+              <a:t>3/4/2019</a:t>
             </a:fld>
             <a:endParaRPr lang="en-US"/>
           </a:p>
@@ -5843,7 +5877,7 @@
           <a:p>
             <a:fld id="{18404ADA-F128-401B-AB3D-33BBB5CCB503}" type="datetimeFigureOut">
               <a:rPr lang="en-US" smtClean="0"/>
-              <a:t>3/3/2019</a:t>
+              <a:t>3/4/2019</a:t>
             </a:fld>
             <a:endParaRPr lang="en-US"/>
           </a:p>
@@ -6084,7 +6118,7 @@
           <a:p>
             <a:fld id="{18404ADA-F128-401B-AB3D-33BBB5CCB503}" type="datetimeFigureOut">
               <a:rPr lang="en-US" smtClean="0"/>
-              <a:t>3/3/2019</a:t>
+              <a:t>3/4/2019</a:t>
             </a:fld>
             <a:endParaRPr lang="en-US"/>
           </a:p>
@@ -8719,7 +8753,7 @@
             <p:ph idx="1"/>
             <p:extLst>
               <p:ext uri="{D42A27DB-BD31-4B8C-83A1-F6EECF244321}">
-                <p14:modId xmlns:p14="http://schemas.microsoft.com/office/powerpoint/2010/main" val="1944608637"/>
+                <p14:modId xmlns:p14="http://schemas.microsoft.com/office/powerpoint/2010/main" val="677523956"/>
               </p:ext>
             </p:extLst>
           </p:nvPr>

</xml_diff>